<commit_message>
Updated tps reports and stories.
</commit_message>
<xml_diff>
--- a/Tps_Storiess.pptx
+++ b/Tps_Storiess.pptx
@@ -5708,7 +5708,7 @@
     <mc:Choice Requires="p14">
       <p:transition spd="slow" p14:dur="2000"/>
     </mc:Choice>
-    <mc:Fallback xmlns="" xmlns:p15="http://schemas.microsoft.com/office/powerpoint/2012/main">
+    <mc:Fallback xmlns:p15="http://schemas.microsoft.com/office/powerpoint/2012/main" xmlns="">
       <p:transition spd="slow"/>
     </mc:Fallback>
   </mc:AlternateContent>
@@ -6432,7 +6432,7 @@
         </p:nvSpPr>
         <p:spPr>
           <a:xfrm>
-            <a:off x="136800" y="1833480"/>
+            <a:off x="136800" y="2139460"/>
             <a:ext cx="9006480" cy="44640"/>
           </a:xfrm>
           <a:prstGeom prst="line">
@@ -6463,7 +6463,7 @@
         </p:nvSpPr>
         <p:spPr>
           <a:xfrm>
-            <a:off x="137520" y="2842560"/>
+            <a:off x="137520" y="3270932"/>
             <a:ext cx="9006480" cy="44640"/>
           </a:xfrm>
           <a:prstGeom prst="line">
@@ -6494,7 +6494,7 @@
         </p:nvSpPr>
         <p:spPr>
           <a:xfrm>
-            <a:off x="136800" y="3637440"/>
+            <a:off x="136800" y="4050513"/>
             <a:ext cx="9006480" cy="44640"/>
           </a:xfrm>
           <a:prstGeom prst="line">
@@ -6525,7 +6525,7 @@
         </p:nvSpPr>
         <p:spPr>
           <a:xfrm>
-            <a:off x="120960" y="4493520"/>
+            <a:off x="120960" y="4814799"/>
             <a:ext cx="9006480" cy="45000"/>
           </a:xfrm>
           <a:prstGeom prst="line">
@@ -6556,7 +6556,7 @@
         </p:nvSpPr>
         <p:spPr>
           <a:xfrm>
-            <a:off x="105840" y="5319720"/>
+            <a:off x="105840" y="5656298"/>
             <a:ext cx="9006120" cy="44640"/>
           </a:xfrm>
           <a:prstGeom prst="line">
@@ -6784,6 +6784,481 @@
             <a:endParaRPr lang="en-US" sz="1800" b="0" strike="noStrike" spc="-1">
               <a:latin typeface="Arial"/>
             </a:endParaRPr>
+          </a:p>
+        </p:txBody>
+      </p:sp>
+      <p:sp>
+        <p:nvSpPr>
+          <p:cNvPr id="2" name="TextBox 1"/>
+          <p:cNvSpPr txBox="1"/>
+          <p:nvPr/>
+        </p:nvSpPr>
+        <p:spPr>
+          <a:xfrm>
+            <a:off x="209235" y="2180932"/>
+            <a:ext cx="1770036" cy="1077218"/>
+          </a:xfrm>
+          <a:prstGeom prst="rect">
+            <a:avLst/>
+          </a:prstGeom>
+          <a:noFill/>
+        </p:spPr>
+        <p:txBody>
+          <a:bodyPr wrap="none" rtlCol="0">
+            <a:spAutoFit/>
+          </a:bodyPr>
+          <a:lstStyle/>
+          <a:p>
+            <a:r>
+              <a:rPr lang="en-US" sz="1600" dirty="0" smtClean="0"/>
+              <a:t>Drop ace editor</a:t>
+            </a:r>
+          </a:p>
+          <a:p>
+            <a:r>
+              <a:rPr lang="en-US" sz="1600" dirty="0" smtClean="0"/>
+              <a:t>in webpage. Find</a:t>
+            </a:r>
+          </a:p>
+          <a:p>
+            <a:r>
+              <a:rPr lang="en-US" sz="1600" dirty="0" smtClean="0"/>
+              <a:t>out how to collect</a:t>
+            </a:r>
+          </a:p>
+          <a:p>
+            <a:r>
+              <a:rPr lang="en-US" sz="1600" dirty="0" smtClean="0"/>
+              <a:t>user input.</a:t>
+            </a:r>
+          </a:p>
+        </p:txBody>
+      </p:sp>
+      <p:sp>
+        <p:nvSpPr>
+          <p:cNvPr id="3" name="TextBox 2"/>
+          <p:cNvSpPr txBox="1"/>
+          <p:nvPr/>
+        </p:nvSpPr>
+        <p:spPr>
+          <a:xfrm>
+            <a:off x="214207" y="1499351"/>
+            <a:ext cx="1891664" cy="523220"/>
+          </a:xfrm>
+          <a:prstGeom prst="rect">
+            <a:avLst/>
+          </a:prstGeom>
+          <a:noFill/>
+        </p:spPr>
+        <p:txBody>
+          <a:bodyPr wrap="none" rtlCol="0">
+            <a:spAutoFit/>
+          </a:bodyPr>
+          <a:lstStyle/>
+          <a:p>
+            <a:r>
+              <a:rPr lang="en-US" sz="1400" dirty="0" smtClean="0"/>
+              <a:t>Locate and download</a:t>
+            </a:r>
+          </a:p>
+          <a:p>
+            <a:r>
+              <a:rPr lang="en-US" sz="1400" dirty="0" smtClean="0"/>
+              <a:t>ace editor library.</a:t>
+            </a:r>
+            <a:endParaRPr lang="en-US" sz="1400" dirty="0"/>
+          </a:p>
+        </p:txBody>
+      </p:sp>
+      <p:sp>
+        <p:nvSpPr>
+          <p:cNvPr id="4" name="TextBox 3"/>
+          <p:cNvSpPr txBox="1"/>
+          <p:nvPr/>
+        </p:nvSpPr>
+        <p:spPr>
+          <a:xfrm>
+            <a:off x="2340983" y="1575848"/>
+            <a:ext cx="582424" cy="369332"/>
+          </a:xfrm>
+          <a:prstGeom prst="rect">
+            <a:avLst/>
+          </a:prstGeom>
+          <a:noFill/>
+        </p:spPr>
+        <p:txBody>
+          <a:bodyPr wrap="none" rtlCol="0">
+            <a:spAutoFit/>
+          </a:bodyPr>
+          <a:lstStyle/>
+          <a:p>
+            <a:r>
+              <a:rPr lang="en-US" dirty="0" smtClean="0"/>
+              <a:t>1 </a:t>
+            </a:r>
+            <a:r>
+              <a:rPr lang="en-US" dirty="0" err="1" smtClean="0"/>
+              <a:t>hr</a:t>
+            </a:r>
+            <a:endParaRPr lang="en-US" dirty="0"/>
+          </a:p>
+        </p:txBody>
+      </p:sp>
+      <p:sp>
+        <p:nvSpPr>
+          <p:cNvPr id="5" name="TextBox 4"/>
+          <p:cNvSpPr txBox="1"/>
+          <p:nvPr/>
+        </p:nvSpPr>
+        <p:spPr>
+          <a:xfrm>
+            <a:off x="3304922" y="1560553"/>
+            <a:ext cx="839067" cy="369332"/>
+          </a:xfrm>
+          <a:prstGeom prst="rect">
+            <a:avLst/>
+          </a:prstGeom>
+          <a:noFill/>
+        </p:spPr>
+        <p:txBody>
+          <a:bodyPr wrap="none" rtlCol="0">
+            <a:spAutoFit/>
+          </a:bodyPr>
+          <a:lstStyle/>
+          <a:p>
+            <a:r>
+              <a:rPr lang="en-US" dirty="0" smtClean="0"/>
+              <a:t>Daniel</a:t>
+            </a:r>
+            <a:endParaRPr lang="en-US" dirty="0"/>
+          </a:p>
+        </p:txBody>
+      </p:sp>
+      <p:sp>
+        <p:nvSpPr>
+          <p:cNvPr id="6" name="TextBox 5"/>
+          <p:cNvSpPr txBox="1"/>
+          <p:nvPr/>
+        </p:nvSpPr>
+        <p:spPr>
+          <a:xfrm>
+            <a:off x="4651372" y="1560551"/>
+            <a:ext cx="582424" cy="369332"/>
+          </a:xfrm>
+          <a:prstGeom prst="rect">
+            <a:avLst/>
+          </a:prstGeom>
+          <a:noFill/>
+        </p:spPr>
+        <p:txBody>
+          <a:bodyPr wrap="none" rtlCol="0">
+            <a:spAutoFit/>
+          </a:bodyPr>
+          <a:lstStyle/>
+          <a:p>
+            <a:r>
+              <a:rPr lang="en-US" dirty="0" smtClean="0"/>
+              <a:t>1 </a:t>
+            </a:r>
+            <a:r>
+              <a:rPr lang="en-US" dirty="0" err="1" smtClean="0"/>
+              <a:t>hr</a:t>
+            </a:r>
+            <a:endParaRPr lang="en-US" dirty="0"/>
+          </a:p>
+        </p:txBody>
+      </p:sp>
+      <p:sp>
+        <p:nvSpPr>
+          <p:cNvPr id="7" name="TextBox 6"/>
+          <p:cNvSpPr txBox="1"/>
+          <p:nvPr/>
+        </p:nvSpPr>
+        <p:spPr>
+          <a:xfrm>
+            <a:off x="5844813" y="1591153"/>
+            <a:ext cx="569800" cy="369332"/>
+          </a:xfrm>
+          <a:prstGeom prst="rect">
+            <a:avLst/>
+          </a:prstGeom>
+          <a:noFill/>
+        </p:spPr>
+        <p:txBody>
+          <a:bodyPr wrap="none" rtlCol="0">
+            <a:spAutoFit/>
+          </a:bodyPr>
+          <a:lstStyle/>
+          <a:p>
+            <a:r>
+              <a:rPr lang="en-US" dirty="0" smtClean="0"/>
+              <a:t>100</a:t>
+            </a:r>
+            <a:endParaRPr lang="en-US" dirty="0"/>
+          </a:p>
+        </p:txBody>
+      </p:sp>
+      <p:sp>
+        <p:nvSpPr>
+          <p:cNvPr id="8" name="TextBox 7"/>
+          <p:cNvSpPr txBox="1"/>
+          <p:nvPr/>
+        </p:nvSpPr>
+        <p:spPr>
+          <a:xfrm>
+            <a:off x="6839352" y="1591148"/>
+            <a:ext cx="774934" cy="369332"/>
+          </a:xfrm>
+          <a:prstGeom prst="rect">
+            <a:avLst/>
+          </a:prstGeom>
+          <a:noFill/>
+        </p:spPr>
+        <p:txBody>
+          <a:bodyPr wrap="none" rtlCol="0">
+            <a:spAutoFit/>
+          </a:bodyPr>
+          <a:lstStyle/>
+          <a:p>
+            <a:r>
+              <a:rPr lang="en-US" dirty="0" smtClean="0"/>
+              <a:t>1.5 </a:t>
+            </a:r>
+            <a:r>
+              <a:rPr lang="en-US" dirty="0" err="1" smtClean="0"/>
+              <a:t>hr</a:t>
+            </a:r>
+            <a:endParaRPr lang="en-US" dirty="0"/>
+          </a:p>
+        </p:txBody>
+      </p:sp>
+      <p:sp>
+        <p:nvSpPr>
+          <p:cNvPr id="9" name="TextBox 8"/>
+          <p:cNvSpPr txBox="1"/>
+          <p:nvPr/>
+        </p:nvSpPr>
+        <p:spPr>
+          <a:xfrm>
+            <a:off x="8109301" y="1606450"/>
+            <a:ext cx="561234" cy="369332"/>
+          </a:xfrm>
+          <a:prstGeom prst="rect">
+            <a:avLst/>
+          </a:prstGeom>
+          <a:noFill/>
+        </p:spPr>
+        <p:txBody>
+          <a:bodyPr wrap="none" rtlCol="0">
+            <a:spAutoFit/>
+          </a:bodyPr>
+          <a:lstStyle/>
+          <a:p>
+            <a:r>
+              <a:rPr lang="en-US" dirty="0" smtClean="0"/>
+              <a:t>Yes</a:t>
+            </a:r>
+            <a:endParaRPr lang="en-US" dirty="0"/>
+          </a:p>
+        </p:txBody>
+      </p:sp>
+      <p:sp>
+        <p:nvSpPr>
+          <p:cNvPr id="33" name="TextBox 32"/>
+          <p:cNvSpPr txBox="1"/>
+          <p:nvPr/>
+        </p:nvSpPr>
+        <p:spPr>
+          <a:xfrm>
+            <a:off x="2340373" y="2508497"/>
+            <a:ext cx="582424" cy="369332"/>
+          </a:xfrm>
+          <a:prstGeom prst="rect">
+            <a:avLst/>
+          </a:prstGeom>
+          <a:noFill/>
+        </p:spPr>
+        <p:txBody>
+          <a:bodyPr wrap="none" rtlCol="0">
+            <a:spAutoFit/>
+          </a:bodyPr>
+          <a:lstStyle/>
+          <a:p>
+            <a:r>
+              <a:rPr lang="en-US" dirty="0"/>
+              <a:t>2</a:t>
+            </a:r>
+            <a:r>
+              <a:rPr lang="en-US" dirty="0" smtClean="0"/>
+              <a:t> </a:t>
+            </a:r>
+            <a:r>
+              <a:rPr lang="en-US" dirty="0" err="1" smtClean="0"/>
+              <a:t>hr</a:t>
+            </a:r>
+            <a:endParaRPr lang="en-US" dirty="0"/>
+          </a:p>
+        </p:txBody>
+      </p:sp>
+      <p:sp>
+        <p:nvSpPr>
+          <p:cNvPr id="34" name="TextBox 33"/>
+          <p:cNvSpPr txBox="1"/>
+          <p:nvPr/>
+        </p:nvSpPr>
+        <p:spPr>
+          <a:xfrm>
+            <a:off x="3304312" y="2493202"/>
+            <a:ext cx="839067" cy="369332"/>
+          </a:xfrm>
+          <a:prstGeom prst="rect">
+            <a:avLst/>
+          </a:prstGeom>
+          <a:noFill/>
+        </p:spPr>
+        <p:txBody>
+          <a:bodyPr wrap="none" rtlCol="0">
+            <a:spAutoFit/>
+          </a:bodyPr>
+          <a:lstStyle/>
+          <a:p>
+            <a:r>
+              <a:rPr lang="en-US" dirty="0" smtClean="0"/>
+              <a:t>Daniel</a:t>
+            </a:r>
+            <a:endParaRPr lang="en-US" dirty="0"/>
+          </a:p>
+        </p:txBody>
+      </p:sp>
+      <p:sp>
+        <p:nvSpPr>
+          <p:cNvPr id="35" name="TextBox 34"/>
+          <p:cNvSpPr txBox="1"/>
+          <p:nvPr/>
+        </p:nvSpPr>
+        <p:spPr>
+          <a:xfrm>
+            <a:off x="4650762" y="2493200"/>
+            <a:ext cx="582424" cy="369332"/>
+          </a:xfrm>
+          <a:prstGeom prst="rect">
+            <a:avLst/>
+          </a:prstGeom>
+          <a:noFill/>
+        </p:spPr>
+        <p:txBody>
+          <a:bodyPr wrap="none" rtlCol="0">
+            <a:spAutoFit/>
+          </a:bodyPr>
+          <a:lstStyle/>
+          <a:p>
+            <a:r>
+              <a:rPr lang="en-US" dirty="0" smtClean="0"/>
+              <a:t>1 </a:t>
+            </a:r>
+            <a:r>
+              <a:rPr lang="en-US" dirty="0" err="1" smtClean="0"/>
+              <a:t>hr</a:t>
+            </a:r>
+            <a:endParaRPr lang="en-US" dirty="0"/>
+          </a:p>
+        </p:txBody>
+      </p:sp>
+      <p:sp>
+        <p:nvSpPr>
+          <p:cNvPr id="36" name="TextBox 35"/>
+          <p:cNvSpPr txBox="1"/>
+          <p:nvPr/>
+        </p:nvSpPr>
+        <p:spPr>
+          <a:xfrm>
+            <a:off x="5844203" y="2523802"/>
+            <a:ext cx="569800" cy="369332"/>
+          </a:xfrm>
+          <a:prstGeom prst="rect">
+            <a:avLst/>
+          </a:prstGeom>
+          <a:noFill/>
+        </p:spPr>
+        <p:txBody>
+          <a:bodyPr wrap="none" rtlCol="0">
+            <a:spAutoFit/>
+          </a:bodyPr>
+          <a:lstStyle/>
+          <a:p>
+            <a:r>
+              <a:rPr lang="en-US" dirty="0" smtClean="0"/>
+              <a:t>100</a:t>
+            </a:r>
+            <a:endParaRPr lang="en-US" dirty="0"/>
+          </a:p>
+        </p:txBody>
+      </p:sp>
+      <p:sp>
+        <p:nvSpPr>
+          <p:cNvPr id="37" name="TextBox 36"/>
+          <p:cNvSpPr txBox="1"/>
+          <p:nvPr/>
+        </p:nvSpPr>
+        <p:spPr>
+          <a:xfrm>
+            <a:off x="6838742" y="2523797"/>
+            <a:ext cx="582424" cy="369332"/>
+          </a:xfrm>
+          <a:prstGeom prst="rect">
+            <a:avLst/>
+          </a:prstGeom>
+          <a:noFill/>
+        </p:spPr>
+        <p:txBody>
+          <a:bodyPr wrap="none" rtlCol="0">
+            <a:spAutoFit/>
+          </a:bodyPr>
+          <a:lstStyle/>
+          <a:p>
+            <a:r>
+              <a:rPr lang="en-US" dirty="0"/>
+              <a:t>2</a:t>
+            </a:r>
+            <a:r>
+              <a:rPr lang="en-US" dirty="0" smtClean="0"/>
+              <a:t> </a:t>
+            </a:r>
+            <a:r>
+              <a:rPr lang="en-US" dirty="0" err="1" smtClean="0"/>
+              <a:t>hr</a:t>
+            </a:r>
+            <a:endParaRPr lang="en-US" dirty="0"/>
+          </a:p>
+        </p:txBody>
+      </p:sp>
+      <p:sp>
+        <p:nvSpPr>
+          <p:cNvPr id="38" name="TextBox 37"/>
+          <p:cNvSpPr txBox="1"/>
+          <p:nvPr/>
+        </p:nvSpPr>
+        <p:spPr>
+          <a:xfrm>
+            <a:off x="8108691" y="2539099"/>
+            <a:ext cx="561234" cy="369332"/>
+          </a:xfrm>
+          <a:prstGeom prst="rect">
+            <a:avLst/>
+          </a:prstGeom>
+          <a:noFill/>
+        </p:spPr>
+        <p:txBody>
+          <a:bodyPr wrap="none" rtlCol="0">
+            <a:spAutoFit/>
+          </a:bodyPr>
+          <a:lstStyle/>
+          <a:p>
+            <a:r>
+              <a:rPr lang="en-US" dirty="0" smtClean="0"/>
+              <a:t>Yes</a:t>
+            </a:r>
+            <a:endParaRPr lang="en-US" dirty="0"/>
           </a:p>
         </p:txBody>
       </p:sp>
@@ -6796,7 +7271,7 @@
     <mc:Choice Requires="p14">
       <p:transition spd="slow" p14:dur="2000"/>
     </mc:Choice>
-    <mc:Fallback xmlns="" xmlns:p15="http://schemas.microsoft.com/office/powerpoint/2012/main">
+    <mc:Fallback xmlns:p15="http://schemas.microsoft.com/office/powerpoint/2012/main" xmlns="">
       <p:transition spd="slow"/>
     </mc:Fallback>
   </mc:AlternateContent>
@@ -7757,7 +8232,7 @@
     <mc:Choice Requires="p14">
       <p:transition spd="slow" p14:dur="2000"/>
     </mc:Choice>
-    <mc:Fallback xmlns="" xmlns:p15="http://schemas.microsoft.com/office/powerpoint/2012/main">
+    <mc:Fallback xmlns:p15="http://schemas.microsoft.com/office/powerpoint/2012/main" xmlns="">
       <p:transition spd="slow"/>
     </mc:Fallback>
   </mc:AlternateContent>
@@ -8693,7 +9168,7 @@
     <mc:Choice Requires="p14">
       <p:transition spd="slow" p14:dur="2000"/>
     </mc:Choice>
-    <mc:Fallback xmlns="" xmlns:p15="http://schemas.microsoft.com/office/powerpoint/2012/main">
+    <mc:Fallback xmlns:p15="http://schemas.microsoft.com/office/powerpoint/2012/main" xmlns="">
       <p:transition spd="slow"/>
     </mc:Fallback>
   </mc:AlternateContent>
@@ -9237,7 +9712,7 @@
         </p:nvSpPr>
         <p:spPr>
           <a:xfrm>
-            <a:off x="415440" y="2757240"/>
+            <a:off x="415440" y="2894931"/>
             <a:ext cx="296280" cy="363960"/>
           </a:xfrm>
           <a:prstGeom prst="rect">
@@ -9293,7 +9768,7 @@
         </p:nvSpPr>
         <p:spPr>
           <a:xfrm>
-            <a:off x="415080" y="3405240"/>
+            <a:off x="415080" y="3512333"/>
             <a:ext cx="296280" cy="363960"/>
           </a:xfrm>
           <a:prstGeom prst="rect">
@@ -9523,7 +9998,7 @@
         </p:nvSpPr>
         <p:spPr>
           <a:xfrm>
-            <a:off x="137520" y="2734920"/>
+            <a:off x="137520" y="2780817"/>
             <a:ext cx="9006480" cy="44640"/>
           </a:xfrm>
           <a:prstGeom prst="line">
@@ -9554,7 +10029,7 @@
         </p:nvSpPr>
         <p:spPr>
           <a:xfrm>
-            <a:off x="137520" y="3207600"/>
+            <a:off x="137520" y="3467683"/>
             <a:ext cx="9006480" cy="44640"/>
           </a:xfrm>
           <a:prstGeom prst="line">
@@ -9767,16 +10242,16 @@
               </a:lnSpc>
             </a:pPr>
             <a:r>
-              <a:rPr lang="en-US" sz="1800" b="1" strike="noStrike" spc="-1">
+              <a:rPr lang="en-US" sz="1800" b="1" strike="noStrike" spc="-1" dirty="0" smtClean="0">
                 <a:solidFill>
                   <a:srgbClr val="000000"/>
                 </a:solidFill>
                 <a:latin typeface="Calibri"/>
                 <a:ea typeface="DejaVu Sans"/>
               </a:rPr>
-              <a:t>Quadratic Solve</a:t>
-            </a:r>
-            <a:endParaRPr lang="en-US" sz="1800" b="0" strike="noStrike" spc="-1">
+              <a:t>Coding Tutorial</a:t>
+            </a:r>
+            <a:endParaRPr lang="en-US" sz="1800" b="0" strike="noStrike" spc="-1" dirty="0">
               <a:latin typeface="Arial"/>
             </a:endParaRPr>
           </a:p>
@@ -9835,6 +10310,372 @@
             <a:endParaRPr lang="en-US" sz="1800" b="0" strike="noStrike" spc="-1">
               <a:latin typeface="Arial"/>
             </a:endParaRPr>
+          </a:p>
+        </p:txBody>
+      </p:sp>
+      <p:sp>
+        <p:nvSpPr>
+          <p:cNvPr id="3" name="TextBox 2"/>
+          <p:cNvSpPr txBox="1"/>
+          <p:nvPr/>
+        </p:nvSpPr>
+        <p:spPr>
+          <a:xfrm>
+            <a:off x="3075414" y="1438159"/>
+            <a:ext cx="3465575" cy="369332"/>
+          </a:xfrm>
+          <a:prstGeom prst="rect">
+            <a:avLst/>
+          </a:prstGeom>
+          <a:noFill/>
+        </p:spPr>
+        <p:txBody>
+          <a:bodyPr wrap="none" rtlCol="0">
+            <a:spAutoFit/>
+          </a:bodyPr>
+          <a:lstStyle/>
+          <a:p>
+            <a:r>
+              <a:rPr lang="en-US" dirty="0" smtClean="0"/>
+              <a:t>Webpage opens with ace editor.</a:t>
+            </a:r>
+            <a:endParaRPr lang="en-US" dirty="0"/>
+          </a:p>
+        </p:txBody>
+      </p:sp>
+      <p:sp>
+        <p:nvSpPr>
+          <p:cNvPr id="4" name="TextBox 3"/>
+          <p:cNvSpPr txBox="1"/>
+          <p:nvPr/>
+        </p:nvSpPr>
+        <p:spPr>
+          <a:xfrm>
+            <a:off x="3076473" y="1972871"/>
+            <a:ext cx="5774913" cy="369332"/>
+          </a:xfrm>
+          <a:prstGeom prst="rect">
+            <a:avLst/>
+          </a:prstGeom>
+          <a:noFill/>
+        </p:spPr>
+        <p:txBody>
+          <a:bodyPr wrap="none" rtlCol="0">
+            <a:spAutoFit/>
+          </a:bodyPr>
+          <a:lstStyle/>
+          <a:p>
+            <a:r>
+              <a:rPr lang="en-US" dirty="0" smtClean="0"/>
+              <a:t>Webpage presents ace editor with sample code inside.</a:t>
+            </a:r>
+            <a:endParaRPr lang="en-US" dirty="0"/>
+          </a:p>
+        </p:txBody>
+      </p:sp>
+      <p:sp>
+        <p:nvSpPr>
+          <p:cNvPr id="5" name="TextBox 4"/>
+          <p:cNvSpPr txBox="1"/>
+          <p:nvPr/>
+        </p:nvSpPr>
+        <p:spPr>
+          <a:xfrm>
+            <a:off x="3106015" y="2402024"/>
+            <a:ext cx="5868125" cy="369332"/>
+          </a:xfrm>
+          <a:prstGeom prst="rect">
+            <a:avLst/>
+          </a:prstGeom>
+          <a:noFill/>
+        </p:spPr>
+        <p:txBody>
+          <a:bodyPr wrap="none" rtlCol="0">
+            <a:spAutoFit/>
+          </a:bodyPr>
+          <a:lstStyle/>
+          <a:p>
+            <a:r>
+              <a:rPr lang="en-US" dirty="0" smtClean="0"/>
+              <a:t>User can either compile sample code or write their own.</a:t>
+            </a:r>
+            <a:endParaRPr lang="en-US" dirty="0"/>
+          </a:p>
+        </p:txBody>
+      </p:sp>
+      <p:sp>
+        <p:nvSpPr>
+          <p:cNvPr id="6" name="TextBox 5"/>
+          <p:cNvSpPr txBox="1"/>
+          <p:nvPr/>
+        </p:nvSpPr>
+        <p:spPr>
+          <a:xfrm>
+            <a:off x="3121315" y="2815113"/>
+            <a:ext cx="5996616" cy="646331"/>
+          </a:xfrm>
+          <a:prstGeom prst="rect">
+            <a:avLst/>
+          </a:prstGeom>
+          <a:noFill/>
+        </p:spPr>
+        <p:txBody>
+          <a:bodyPr wrap="none" rtlCol="0">
+            <a:spAutoFit/>
+          </a:bodyPr>
+          <a:lstStyle/>
+          <a:p>
+            <a:r>
+              <a:rPr lang="en-US" dirty="0" smtClean="0"/>
+              <a:t>When user presses compile webpage extracts code from</a:t>
+            </a:r>
+          </a:p>
+          <a:p>
+            <a:r>
+              <a:rPr lang="en-US" dirty="0" smtClean="0"/>
+              <a:t>ace editor.</a:t>
+            </a:r>
+            <a:endParaRPr lang="en-US" dirty="0"/>
+          </a:p>
+        </p:txBody>
+      </p:sp>
+      <p:sp>
+        <p:nvSpPr>
+          <p:cNvPr id="7" name="TextBox 6"/>
+          <p:cNvSpPr txBox="1"/>
+          <p:nvPr/>
+        </p:nvSpPr>
+        <p:spPr>
+          <a:xfrm>
+            <a:off x="3151915" y="3549485"/>
+            <a:ext cx="5689027" cy="369332"/>
+          </a:xfrm>
+          <a:prstGeom prst="rect">
+            <a:avLst/>
+          </a:prstGeom>
+          <a:noFill/>
+        </p:spPr>
+        <p:txBody>
+          <a:bodyPr wrap="none" rtlCol="0">
+            <a:spAutoFit/>
+          </a:bodyPr>
+          <a:lstStyle/>
+          <a:p>
+            <a:r>
+              <a:rPr lang="en-US" dirty="0" smtClean="0"/>
+              <a:t>Code is stored in file to await execution through Get().</a:t>
+            </a:r>
+            <a:endParaRPr lang="en-US" dirty="0"/>
+          </a:p>
+        </p:txBody>
+      </p:sp>
+      <p:sp>
+        <p:nvSpPr>
+          <p:cNvPr id="8" name="TextBox 7"/>
+          <p:cNvSpPr txBox="1"/>
+          <p:nvPr/>
+        </p:nvSpPr>
+        <p:spPr>
+          <a:xfrm>
+            <a:off x="3167217" y="4146166"/>
+            <a:ext cx="5740198" cy="369332"/>
+          </a:xfrm>
+          <a:prstGeom prst="rect">
+            <a:avLst/>
+          </a:prstGeom>
+          <a:noFill/>
+        </p:spPr>
+        <p:txBody>
+          <a:bodyPr wrap="none" rtlCol="0">
+            <a:spAutoFit/>
+          </a:bodyPr>
+          <a:lstStyle/>
+          <a:p>
+            <a:r>
+              <a:rPr lang="en-US" dirty="0" smtClean="0"/>
+              <a:t>Server side extracts code from file and executes code.</a:t>
+            </a:r>
+            <a:endParaRPr lang="en-US" dirty="0"/>
+          </a:p>
+        </p:txBody>
+      </p:sp>
+      <p:sp>
+        <p:nvSpPr>
+          <p:cNvPr id="9" name="TextBox 8"/>
+          <p:cNvSpPr txBox="1"/>
+          <p:nvPr/>
+        </p:nvSpPr>
+        <p:spPr>
+          <a:xfrm>
+            <a:off x="1071037" y="1453454"/>
+            <a:ext cx="1814582" cy="369332"/>
+          </a:xfrm>
+          <a:prstGeom prst="rect">
+            <a:avLst/>
+          </a:prstGeom>
+          <a:noFill/>
+        </p:spPr>
+        <p:txBody>
+          <a:bodyPr wrap="none" rtlCol="0">
+            <a:spAutoFit/>
+          </a:bodyPr>
+          <a:lstStyle/>
+          <a:p>
+            <a:r>
+              <a:rPr lang="en-US" dirty="0" smtClean="0"/>
+              <a:t>Open webpage</a:t>
+            </a:r>
+            <a:endParaRPr lang="en-US" dirty="0"/>
+          </a:p>
+        </p:txBody>
+      </p:sp>
+      <p:sp>
+        <p:nvSpPr>
+          <p:cNvPr id="34" name="TextBox 33"/>
+          <p:cNvSpPr txBox="1"/>
+          <p:nvPr/>
+        </p:nvSpPr>
+        <p:spPr>
+          <a:xfrm>
+            <a:off x="1070427" y="1881236"/>
+            <a:ext cx="1621733" cy="369332"/>
+          </a:xfrm>
+          <a:prstGeom prst="rect">
+            <a:avLst/>
+          </a:prstGeom>
+          <a:noFill/>
+        </p:spPr>
+        <p:txBody>
+          <a:bodyPr wrap="none" rtlCol="0">
+            <a:spAutoFit/>
+          </a:bodyPr>
+          <a:lstStyle/>
+          <a:p>
+            <a:r>
+              <a:rPr lang="en-US" dirty="0" smtClean="0"/>
+              <a:t>Present editor</a:t>
+            </a:r>
+            <a:endParaRPr lang="en-US" dirty="0"/>
+          </a:p>
+        </p:txBody>
+      </p:sp>
+      <p:sp>
+        <p:nvSpPr>
+          <p:cNvPr id="35" name="TextBox 34"/>
+          <p:cNvSpPr txBox="1"/>
+          <p:nvPr/>
+        </p:nvSpPr>
+        <p:spPr>
+          <a:xfrm>
+            <a:off x="1101029" y="2309608"/>
+            <a:ext cx="1236712" cy="369332"/>
+          </a:xfrm>
+          <a:prstGeom prst="rect">
+            <a:avLst/>
+          </a:prstGeom>
+          <a:noFill/>
+        </p:spPr>
+        <p:txBody>
+          <a:bodyPr wrap="none" rtlCol="0">
+            <a:spAutoFit/>
+          </a:bodyPr>
+          <a:lstStyle/>
+          <a:p>
+            <a:r>
+              <a:rPr lang="en-US" dirty="0" smtClean="0"/>
+              <a:t>User input</a:t>
+            </a:r>
+            <a:endParaRPr lang="en-US" dirty="0"/>
+          </a:p>
+        </p:txBody>
+      </p:sp>
+      <p:sp>
+        <p:nvSpPr>
+          <p:cNvPr id="10" name="TextBox 9"/>
+          <p:cNvSpPr txBox="1"/>
+          <p:nvPr/>
+        </p:nvSpPr>
+        <p:spPr>
+          <a:xfrm>
+            <a:off x="1116939" y="2891609"/>
+            <a:ext cx="1801395" cy="369332"/>
+          </a:xfrm>
+          <a:prstGeom prst="rect">
+            <a:avLst/>
+          </a:prstGeom>
+          <a:noFill/>
+        </p:spPr>
+        <p:txBody>
+          <a:bodyPr wrap="none" rtlCol="0">
+            <a:spAutoFit/>
+          </a:bodyPr>
+          <a:lstStyle/>
+          <a:p>
+            <a:r>
+              <a:rPr lang="en-US" dirty="0" smtClean="0"/>
+              <a:t>Code extraction</a:t>
+            </a:r>
+            <a:endParaRPr lang="en-US" dirty="0"/>
+          </a:p>
+        </p:txBody>
+      </p:sp>
+      <p:sp>
+        <p:nvSpPr>
+          <p:cNvPr id="11" name="TextBox 10"/>
+          <p:cNvSpPr txBox="1"/>
+          <p:nvPr/>
+        </p:nvSpPr>
+        <p:spPr>
+          <a:xfrm>
+            <a:off x="1147541" y="3534188"/>
+            <a:ext cx="1390788" cy="369332"/>
+          </a:xfrm>
+          <a:prstGeom prst="rect">
+            <a:avLst/>
+          </a:prstGeom>
+          <a:noFill/>
+        </p:spPr>
+        <p:txBody>
+          <a:bodyPr wrap="none" rtlCol="0">
+            <a:spAutoFit/>
+          </a:bodyPr>
+          <a:lstStyle/>
+          <a:p>
+            <a:r>
+              <a:rPr lang="en-US" dirty="0" smtClean="0"/>
+              <a:t>Get request</a:t>
+            </a:r>
+            <a:endParaRPr lang="en-US" dirty="0"/>
+          </a:p>
+        </p:txBody>
+      </p:sp>
+      <p:sp>
+        <p:nvSpPr>
+          <p:cNvPr id="12" name="TextBox 11"/>
+          <p:cNvSpPr txBox="1"/>
+          <p:nvPr/>
+        </p:nvSpPr>
+        <p:spPr>
+          <a:xfrm>
+            <a:off x="1193442" y="4130867"/>
+            <a:ext cx="1198390" cy="369332"/>
+          </a:xfrm>
+          <a:prstGeom prst="rect">
+            <a:avLst/>
+          </a:prstGeom>
+          <a:noFill/>
+        </p:spPr>
+        <p:txBody>
+          <a:bodyPr wrap="none" rtlCol="0">
+            <a:spAutoFit/>
+          </a:bodyPr>
+          <a:lstStyle/>
+          <a:p>
+            <a:r>
+              <a:rPr lang="en-US" dirty="0" smtClean="0"/>
+              <a:t>Execution</a:t>
+            </a:r>
+            <a:endParaRPr lang="en-US" dirty="0"/>
           </a:p>
         </p:txBody>
       </p:sp>
@@ -9847,7 +10688,7 @@
     <mc:Choice Requires="p14">
       <p:transition spd="slow" p14:dur="2000"/>
     </mc:Choice>
-    <mc:Fallback xmlns="" xmlns:p15="http://schemas.microsoft.com/office/powerpoint/2012/main">
+    <mc:Fallback xmlns:p15="http://schemas.microsoft.com/office/powerpoint/2012/main" xmlns="">
       <p:transition spd="slow"/>
     </mc:Fallback>
   </mc:AlternateContent>
@@ -10075,7 +10916,7 @@
     <mc:Choice Requires="p14">
       <p:transition spd="slow" p14:dur="2000"/>
     </mc:Choice>
-    <mc:Fallback xmlns="" xmlns:p15="http://schemas.microsoft.com/office/powerpoint/2012/main">
+    <mc:Fallback xmlns:p15="http://schemas.microsoft.com/office/powerpoint/2012/main" xmlns="">
       <p:transition spd="slow"/>
     </mc:Fallback>
   </mc:AlternateContent>

</xml_diff>